<commit_message>
Updated version number to v2.1 since the previous (non ppt template version) was v2 already. preparing for release. also issue #7 (done by Rosanne!)
</commit_message>
<xml_diff>
--- a/Scrum Accountabilities A6.pptx
+++ b/Scrum Accountabilities A6.pptx
@@ -842,7 +842,7 @@
           <a:p>
             <a:fld id="{67FFBD53-BB99-BF49-B767-DA041D16D15C}" type="datetimeFigureOut">
               <a:rPr lang="nl-NL" smtClean="0"/>
-              <a:t>15-02-2023</a:t>
+              <a:t>22-03-2023</a:t>
             </a:fld>
             <a:endParaRPr lang="nl-NL"/>
           </a:p>
@@ -1000,7 +1000,7 @@
           <a:p>
             <a:fld id="{FB92A8C8-0AF6-A743-927A-8B6BB1876AEC}" type="slidenum">
               <a:rPr lang="nl-NL" smtClean="0"/>
-              <a:t>‹nr.›</a:t>
+              <a:t>‹#›</a:t>
             </a:fld>
             <a:endParaRPr lang="nl-NL"/>
           </a:p>
@@ -8504,7 +8504,7 @@
           <a:p>
             <a:r>
               <a:rPr lang="en-GB"/>
-              <a:t>V 1.0</a:t>
+              <a:t>V 2.1</a:t>
             </a:r>
             <a:endParaRPr lang="en-NL" dirty="0"/>
           </a:p>
@@ -10466,7 +10466,7 @@
           <a:p>
             <a:r>
               <a:rPr lang="en-GB"/>
-              <a:t>V 1.0</a:t>
+              <a:t>V 2.1</a:t>
             </a:r>
             <a:endParaRPr lang="en-NL"/>
           </a:p>
@@ -10782,7 +10782,7 @@
           <a:p>
             <a:r>
               <a:rPr lang="en-GB"/>
-              <a:t>V 1.0</a:t>
+              <a:t>V 2.1</a:t>
             </a:r>
             <a:endParaRPr lang="en-NL"/>
           </a:p>
@@ -10989,7 +10989,7 @@
           <a:p>
             <a:r>
               <a:rPr lang="en-GB"/>
-              <a:t>V 1.0</a:t>
+              <a:t>V 2.1</a:t>
             </a:r>
             <a:endParaRPr lang="en-NL"/>
           </a:p>
@@ -14660,7 +14660,7 @@
           <a:p>
             <a:r>
               <a:rPr lang="en-GB"/>
-              <a:t>V 1.0</a:t>
+              <a:t>V 2.1</a:t>
             </a:r>
             <a:endParaRPr lang="en-NL" dirty="0"/>
           </a:p>
@@ -15895,7 +15895,7 @@
           <a:p>
             <a:r>
               <a:rPr lang="en-GB"/>
-              <a:t>V 1.0</a:t>
+              <a:t>V 2.1</a:t>
             </a:r>
             <a:endParaRPr lang="en-NL"/>
           </a:p>
@@ -17043,8 +17043,8 @@
           </a:prstGeom>
         </p:spPr>
       </p:pic>
-      <mc:AlternateContent xmlns:mc="http://schemas.openxmlformats.org/markup-compatibility/2006">
-        <mc:Choice xmlns:p14="http://schemas.microsoft.com/office/powerpoint/2010/main" Requires="p14">
+      <mc:AlternateContent xmlns:mc="http://schemas.openxmlformats.org/markup-compatibility/2006" xmlns:p14="http://schemas.microsoft.com/office/powerpoint/2010/main">
+        <mc:Choice Requires="p14">
           <p:contentPart p14:bwMode="auto" r:id="rId5">
             <p14:nvContentPartPr>
               <p14:cNvPr id="19" name="Inkt 18">
@@ -17063,7 +17063,7 @@
             </p14:xfrm>
           </p:contentPart>
         </mc:Choice>
-        <mc:Fallback>
+        <mc:Fallback xmlns="">
           <p:pic>
             <p:nvPicPr>
               <p:cNvPr id="19" name="Inkt 18">
@@ -17114,8 +17114,8 @@
             <a:chExt cx="70560" cy="84600"/>
           </a:xfrm>
         </p:grpSpPr>
-        <mc:AlternateContent xmlns:mc="http://schemas.openxmlformats.org/markup-compatibility/2006">
-          <mc:Choice xmlns:p14="http://schemas.microsoft.com/office/powerpoint/2010/main" Requires="p14">
+        <mc:AlternateContent xmlns:mc="http://schemas.openxmlformats.org/markup-compatibility/2006" xmlns:p14="http://schemas.microsoft.com/office/powerpoint/2010/main">
+          <mc:Choice Requires="p14">
             <p:contentPart p14:bwMode="auto" r:id="rId7">
               <p14:nvContentPartPr>
                 <p14:cNvPr id="8" name="Inkt 7">
@@ -17134,7 +17134,7 @@
               </p14:xfrm>
             </p:contentPart>
           </mc:Choice>
-          <mc:Fallback>
+          <mc:Fallback xmlns="">
             <p:pic>
               <p:nvPicPr>
                 <p:cNvPr id="8" name="Inkt 7">
@@ -17165,8 +17165,8 @@
             </p:pic>
           </mc:Fallback>
         </mc:AlternateContent>
-        <mc:AlternateContent xmlns:mc="http://schemas.openxmlformats.org/markup-compatibility/2006">
-          <mc:Choice xmlns:p14="http://schemas.microsoft.com/office/powerpoint/2010/main" Requires="p14">
+        <mc:AlternateContent xmlns:mc="http://schemas.openxmlformats.org/markup-compatibility/2006" xmlns:p14="http://schemas.microsoft.com/office/powerpoint/2010/main">
+          <mc:Choice Requires="p14">
             <p:contentPart p14:bwMode="auto" r:id="rId9">
               <p14:nvContentPartPr>
                 <p14:cNvPr id="9" name="Inkt 8">
@@ -17185,7 +17185,7 @@
               </p14:xfrm>
             </p:contentPart>
           </mc:Choice>
-          <mc:Fallback>
+          <mc:Fallback xmlns="">
             <p:pic>
               <p:nvPicPr>
                 <p:cNvPr id="9" name="Inkt 8">
@@ -17216,8 +17216,8 @@
             </p:pic>
           </mc:Fallback>
         </mc:AlternateContent>
-        <mc:AlternateContent xmlns:mc="http://schemas.openxmlformats.org/markup-compatibility/2006">
-          <mc:Choice xmlns:p14="http://schemas.microsoft.com/office/powerpoint/2010/main" Requires="p14">
+        <mc:AlternateContent xmlns:mc="http://schemas.openxmlformats.org/markup-compatibility/2006" xmlns:p14="http://schemas.microsoft.com/office/powerpoint/2010/main">
+          <mc:Choice Requires="p14">
             <p:contentPart p14:bwMode="auto" r:id="rId11">
               <p14:nvContentPartPr>
                 <p14:cNvPr id="11" name="Inkt 10">
@@ -17236,7 +17236,7 @@
               </p14:xfrm>
             </p:contentPart>
           </mc:Choice>
-          <mc:Fallback>
+          <mc:Fallback xmlns="">
             <p:pic>
               <p:nvPicPr>
                 <p:cNvPr id="11" name="Inkt 10">
@@ -17267,8 +17267,8 @@
             </p:pic>
           </mc:Fallback>
         </mc:AlternateContent>
-        <mc:AlternateContent xmlns:mc="http://schemas.openxmlformats.org/markup-compatibility/2006">
-          <mc:Choice xmlns:p14="http://schemas.microsoft.com/office/powerpoint/2010/main" Requires="p14">
+        <mc:AlternateContent xmlns:mc="http://schemas.openxmlformats.org/markup-compatibility/2006" xmlns:p14="http://schemas.microsoft.com/office/powerpoint/2010/main">
+          <mc:Choice Requires="p14">
             <p:contentPart p14:bwMode="auto" r:id="rId13">
               <p14:nvContentPartPr>
                 <p14:cNvPr id="13" name="Inkt 12">
@@ -17287,7 +17287,7 @@
               </p14:xfrm>
             </p:contentPart>
           </mc:Choice>
-          <mc:Fallback>
+          <mc:Fallback xmlns="">
             <p:pic>
               <p:nvPicPr>
                 <p:cNvPr id="13" name="Inkt 12">
@@ -17318,8 +17318,8 @@
             </p:pic>
           </mc:Fallback>
         </mc:AlternateContent>
-        <mc:AlternateContent xmlns:mc="http://schemas.openxmlformats.org/markup-compatibility/2006">
-          <mc:Choice xmlns:p14="http://schemas.microsoft.com/office/powerpoint/2010/main" Requires="p14">
+        <mc:AlternateContent xmlns:mc="http://schemas.openxmlformats.org/markup-compatibility/2006" xmlns:p14="http://schemas.microsoft.com/office/powerpoint/2010/main">
+          <mc:Choice Requires="p14">
             <p:contentPart p14:bwMode="auto" r:id="rId14">
               <p14:nvContentPartPr>
                 <p14:cNvPr id="15" name="Inkt 14">
@@ -17338,7 +17338,7 @@
               </p14:xfrm>
             </p:contentPart>
           </mc:Choice>
-          <mc:Fallback>
+          <mc:Fallback xmlns="">
             <p:pic>
               <p:nvPicPr>
                 <p:cNvPr id="15" name="Inkt 14">
@@ -17369,8 +17369,8 @@
             </p:pic>
           </mc:Fallback>
         </mc:AlternateContent>
-        <mc:AlternateContent xmlns:mc="http://schemas.openxmlformats.org/markup-compatibility/2006">
-          <mc:Choice xmlns:p14="http://schemas.microsoft.com/office/powerpoint/2010/main" Requires="p14">
+        <mc:AlternateContent xmlns:mc="http://schemas.openxmlformats.org/markup-compatibility/2006" xmlns:p14="http://schemas.microsoft.com/office/powerpoint/2010/main">
+          <mc:Choice Requires="p14">
             <p:contentPart p14:bwMode="auto" r:id="rId15">
               <p14:nvContentPartPr>
                 <p14:cNvPr id="17" name="Inkt 16">
@@ -17389,7 +17389,7 @@
               </p14:xfrm>
             </p:contentPart>
           </mc:Choice>
-          <mc:Fallback>
+          <mc:Fallback xmlns="">
             <p:pic>
               <p:nvPicPr>
                 <p:cNvPr id="17" name="Inkt 16">
@@ -17420,8 +17420,8 @@
             </p:pic>
           </mc:Fallback>
         </mc:AlternateContent>
-        <mc:AlternateContent xmlns:mc="http://schemas.openxmlformats.org/markup-compatibility/2006">
-          <mc:Choice xmlns:p14="http://schemas.microsoft.com/office/powerpoint/2010/main" Requires="p14">
+        <mc:AlternateContent xmlns:mc="http://schemas.openxmlformats.org/markup-compatibility/2006" xmlns:p14="http://schemas.microsoft.com/office/powerpoint/2010/main">
+          <mc:Choice Requires="p14">
             <p:contentPart p14:bwMode="auto" r:id="rId16">
               <p14:nvContentPartPr>
                 <p14:cNvPr id="21" name="Inkt 20">
@@ -17440,7 +17440,7 @@
               </p14:xfrm>
             </p:contentPart>
           </mc:Choice>
-          <mc:Fallback>
+          <mc:Fallback xmlns="">
             <p:pic>
               <p:nvPicPr>
                 <p:cNvPr id="21" name="Inkt 20">
@@ -17471,8 +17471,8 @@
             </p:pic>
           </mc:Fallback>
         </mc:AlternateContent>
-        <mc:AlternateContent xmlns:mc="http://schemas.openxmlformats.org/markup-compatibility/2006">
-          <mc:Choice xmlns:p14="http://schemas.microsoft.com/office/powerpoint/2010/main" Requires="p14">
+        <mc:AlternateContent xmlns:mc="http://schemas.openxmlformats.org/markup-compatibility/2006" xmlns:p14="http://schemas.microsoft.com/office/powerpoint/2010/main">
+          <mc:Choice Requires="p14">
             <p:contentPart p14:bwMode="auto" r:id="rId17">
               <p14:nvContentPartPr>
                 <p14:cNvPr id="23" name="Inkt 22">
@@ -17491,7 +17491,7 @@
               </p14:xfrm>
             </p:contentPart>
           </mc:Choice>
-          <mc:Fallback>
+          <mc:Fallback xmlns="">
             <p:pic>
               <p:nvPicPr>
                 <p:cNvPr id="23" name="Inkt 22">
@@ -17522,8 +17522,8 @@
             </p:pic>
           </mc:Fallback>
         </mc:AlternateContent>
-        <mc:AlternateContent xmlns:mc="http://schemas.openxmlformats.org/markup-compatibility/2006">
-          <mc:Choice xmlns:p14="http://schemas.microsoft.com/office/powerpoint/2010/main" Requires="p14">
+        <mc:AlternateContent xmlns:mc="http://schemas.openxmlformats.org/markup-compatibility/2006" xmlns:p14="http://schemas.microsoft.com/office/powerpoint/2010/main">
+          <mc:Choice Requires="p14">
             <p:contentPart p14:bwMode="auto" r:id="rId18">
               <p14:nvContentPartPr>
                 <p14:cNvPr id="25" name="Inkt 24">
@@ -17542,7 +17542,7 @@
               </p14:xfrm>
             </p:contentPart>
           </mc:Choice>
-          <mc:Fallback>
+          <mc:Fallback xmlns="">
             <p:pic>
               <p:nvPicPr>
                 <p:cNvPr id="25" name="Inkt 24">
@@ -17955,7 +17955,7 @@
           <a:p>
             <a:r>
               <a:rPr lang="en-GB"/>
-              <a:t>V 1.0</a:t>
+              <a:t>V 2.1</a:t>
             </a:r>
             <a:endParaRPr lang="en-NL"/>
           </a:p>
@@ -18603,7 +18603,7 @@
           <a:p>
             <a:r>
               <a:rPr lang="en-GB"/>
-              <a:t>V 1.0</a:t>
+              <a:t>V 2.1</a:t>
             </a:r>
             <a:endParaRPr lang="en-NL"/>
           </a:p>
@@ -20697,7 +20697,7 @@
           <a:p>
             <a:r>
               <a:rPr lang="en-GB"/>
-              <a:t>V 1.0</a:t>
+              <a:t>V 2.1</a:t>
             </a:r>
             <a:endParaRPr lang="en-NL" dirty="0"/>
           </a:p>
@@ -21622,7 +21622,7 @@
           <a:p>
             <a:r>
               <a:rPr lang="en-GB"/>
-              <a:t>V 1.0</a:t>
+              <a:t>V 2.1</a:t>
             </a:r>
             <a:endParaRPr lang="en-NL"/>
           </a:p>
@@ -23606,7 +23606,7 @@
           <a:p>
             <a:r>
               <a:rPr lang="en-GB"/>
-              <a:t>V 1.0</a:t>
+              <a:t>V 2.1</a:t>
             </a:r>
             <a:endParaRPr lang="en-NL"/>
           </a:p>
@@ -26032,7 +26032,7 @@
           <a:p>
             <a:r>
               <a:rPr lang="en-GB"/>
-              <a:t>V 1.0</a:t>
+              <a:t>V 2.1</a:t>
             </a:r>
             <a:endParaRPr lang="en-NL"/>
           </a:p>

</xml_diff>